<commit_message>
support text style change
</commit_message>
<xml_diff>
--- a/src/tests/data_replace/text_replace.pptx
+++ b/src/tests/data_replace/text_replace.pptx
@@ -5,11 +5,12 @@
     <p:sldMasterId id="2147483648" r:id="rId1"/>
   </p:sldMasterIdLst>
   <p:notesMasterIdLst>
-    <p:notesMasterId r:id="rId4"/>
+    <p:notesMasterId r:id="rId5"/>
   </p:notesMasterIdLst>
   <p:sldIdLst>
     <p:sldId id="256" r:id="rId2"/>
     <p:sldId id="257" r:id="rId3"/>
+    <p:sldId id="258" r:id="rId4"/>
   </p:sldIdLst>
   <p:sldSz cx="12192000" cy="6858000"/>
   <p:notesSz cx="6858000" cy="9144000"/>
@@ -198,7 +199,7 @@
           <a:p>
             <a:fld id="{6BC63A02-2CEB-B447-8BC6-BB856972B046}" type="datetimeFigureOut">
               <a:rPr kumimoji="1" lang="ko-KR" altLang="en-US" smtClean="0"/>
-              <a:t>2020. 7. 8.</a:t>
+              <a:t>2020. 7. 15.</a:t>
             </a:fld>
             <a:endParaRPr kumimoji="1" lang="ko-KR" altLang="en-US"/>
           </a:p>
@@ -608,6 +609,90 @@
 </p:notes>
 </file>
 
+<file path=ppt/notesSlides/notesSlide3.xml><?xml version="1.0" encoding="utf-8"?>
+<p:notes xmlns:a="http://schemas.openxmlformats.org/drawingml/2006/main" xmlns:r="http://schemas.openxmlformats.org/officeDocument/2006/relationships" xmlns:p="http://schemas.openxmlformats.org/presentationml/2006/main">
+  <p:cSld>
+    <p:spTree>
+      <p:nvGrpSpPr>
+        <p:cNvPr id="1" name=""/>
+        <p:cNvGrpSpPr/>
+        <p:nvPr/>
+      </p:nvGrpSpPr>
+      <p:grpSpPr>
+        <a:xfrm>
+          <a:off x="0" y="0"/>
+          <a:ext cx="0" cy="0"/>
+          <a:chOff x="0" y="0"/>
+          <a:chExt cx="0" cy="0"/>
+        </a:xfrm>
+      </p:grpSpPr>
+      <p:sp>
+        <p:nvSpPr>
+          <p:cNvPr id="2" name="슬라이드 이미지 개체 틀 1"/>
+          <p:cNvSpPr>
+            <a:spLocks noGrp="1" noRot="1" noChangeAspect="1"/>
+          </p:cNvSpPr>
+          <p:nvPr>
+            <p:ph type="sldImg"/>
+          </p:nvPr>
+        </p:nvSpPr>
+        <p:spPr/>
+      </p:sp>
+      <p:sp>
+        <p:nvSpPr>
+          <p:cNvPr id="3" name="슬라이드 노트 개체 틀 2"/>
+          <p:cNvSpPr>
+            <a:spLocks noGrp="1"/>
+          </p:cNvSpPr>
+          <p:nvPr>
+            <p:ph type="body" idx="1"/>
+          </p:nvPr>
+        </p:nvSpPr>
+        <p:spPr/>
+        <p:txBody>
+          <a:bodyPr/>
+          <a:lstStyle/>
+          <a:p>
+            <a:endParaRPr kumimoji="1" lang="ko-KR" altLang="en-US"/>
+          </a:p>
+        </p:txBody>
+      </p:sp>
+      <p:sp>
+        <p:nvSpPr>
+          <p:cNvPr id="4" name="슬라이드 번호 개체 틀 3"/>
+          <p:cNvSpPr>
+            <a:spLocks noGrp="1"/>
+          </p:cNvSpPr>
+          <p:nvPr>
+            <p:ph type="sldNum" sz="quarter" idx="5"/>
+          </p:nvPr>
+        </p:nvSpPr>
+        <p:spPr/>
+        <p:txBody>
+          <a:bodyPr/>
+          <a:lstStyle/>
+          <a:p>
+            <a:fld id="{EB6E6ABA-03F1-1848-A9DB-F06A19CD2D8B}" type="slidenum">
+              <a:rPr kumimoji="1" lang="ko-KR" altLang="en-US" smtClean="0"/>
+              <a:t>3</a:t>
+            </a:fld>
+            <a:endParaRPr kumimoji="1" lang="ko-KR" altLang="en-US"/>
+          </a:p>
+        </p:txBody>
+      </p:sp>
+    </p:spTree>
+    <p:extLst>
+      <p:ext uri="{BB962C8B-B14F-4D97-AF65-F5344CB8AC3E}">
+        <p14:creationId xmlns:p14="http://schemas.microsoft.com/office/powerpoint/2010/main" val="4281088033"/>
+      </p:ext>
+    </p:extLst>
+  </p:cSld>
+  <p:clrMapOvr>
+    <a:masterClrMapping/>
+  </p:clrMapOvr>
+</p:notes>
+</file>
+
 <file path=ppt/slideLayouts/slideLayout1.xml><?xml version="1.0" encoding="utf-8"?>
 <p:sldLayout xmlns:a="http://schemas.openxmlformats.org/drawingml/2006/main" xmlns:r="http://schemas.openxmlformats.org/officeDocument/2006/relationships" xmlns:p="http://schemas.openxmlformats.org/presentationml/2006/main" preserve="1" userDrawn="1">
   <p:cSld name="simple_title">
@@ -1109,7 +1194,7 @@
           <a:p>
             <a:fld id="{3C112CD5-217C-714B-8600-5452942EA0E3}" type="datetimeFigureOut">
               <a:rPr kumimoji="1" lang="ko-KR" altLang="en-US" smtClean="0"/>
-              <a:t>2020. 7. 8.</a:t>
+              <a:t>2020. 7. 15.</a:t>
             </a:fld>
             <a:endParaRPr kumimoji="1" lang="ko-KR" altLang="en-US"/>
           </a:p>
@@ -1909,6 +1994,180 @@
     <p:extLst>
       <p:ext uri="{BB962C8B-B14F-4D97-AF65-F5344CB8AC3E}">
         <p14:creationId xmlns:p14="http://schemas.microsoft.com/office/powerpoint/2010/main" val="1486549531"/>
+      </p:ext>
+    </p:extLst>
+  </p:cSld>
+  <p:clrMapOvr>
+    <a:masterClrMapping/>
+  </p:clrMapOvr>
+</p:sld>
+</file>
+
+<file path=ppt/slides/slide3.xml><?xml version="1.0" encoding="utf-8"?>
+<p:sld xmlns:a="http://schemas.openxmlformats.org/drawingml/2006/main" xmlns:r="http://schemas.openxmlformats.org/officeDocument/2006/relationships" xmlns:p="http://schemas.openxmlformats.org/presentationml/2006/main">
+  <p:cSld>
+    <p:spTree>
+      <p:nvGrpSpPr>
+        <p:cNvPr id="1" name=""/>
+        <p:cNvGrpSpPr/>
+        <p:nvPr/>
+      </p:nvGrpSpPr>
+      <p:grpSpPr>
+        <a:xfrm>
+          <a:off x="0" y="0"/>
+          <a:ext cx="0" cy="0"/>
+          <a:chOff x="0" y="0"/>
+          <a:chExt cx="0" cy="0"/>
+        </a:xfrm>
+      </p:grpSpPr>
+      <p:sp>
+        <p:nvSpPr>
+          <p:cNvPr id="4" name="bold_text">
+            <a:extLst>
+              <a:ext uri="{FF2B5EF4-FFF2-40B4-BE49-F238E27FC236}">
+                <a16:creationId xmlns:a16="http://schemas.microsoft.com/office/drawing/2014/main" id="{06300A4B-320D-C94F-B3B5-6B6A99199560}"/>
+              </a:ext>
+            </a:extLst>
+          </p:cNvPr>
+          <p:cNvSpPr txBox="1"/>
+          <p:nvPr/>
+        </p:nvSpPr>
+        <p:spPr>
+          <a:xfrm>
+            <a:off x="838200" y="334108"/>
+            <a:ext cx="4998156" cy="584775"/>
+          </a:xfrm>
+          <a:prstGeom prst="rect">
+            <a:avLst/>
+          </a:prstGeom>
+          <a:noFill/>
+        </p:spPr>
+        <p:txBody>
+          <a:bodyPr wrap="square" rtlCol="0">
+            <a:spAutoFit/>
+          </a:bodyPr>
+          <a:lstStyle/>
+          <a:p>
+            <a:r>
+              <a:rPr kumimoji="1" lang="en-US" altLang="ko-KR" sz="3200" b="1" dirty="0"/>
+              <a:t>Bold true to false</a:t>
+            </a:r>
+            <a:endParaRPr kumimoji="1" lang="ko-KR" altLang="en-US" sz="3200" b="1" dirty="0"/>
+          </a:p>
+        </p:txBody>
+      </p:sp>
+      <p:sp>
+        <p:nvSpPr>
+          <p:cNvPr id="7" name="italic_text">
+            <a:extLst>
+              <a:ext uri="{FF2B5EF4-FFF2-40B4-BE49-F238E27FC236}">
+                <a16:creationId xmlns:a16="http://schemas.microsoft.com/office/drawing/2014/main" id="{7FA5F42A-99CE-C240-AFD3-8374FA9FC9F0}"/>
+              </a:ext>
+            </a:extLst>
+          </p:cNvPr>
+          <p:cNvSpPr txBox="1"/>
+          <p:nvPr/>
+        </p:nvSpPr>
+        <p:spPr>
+          <a:xfrm>
+            <a:off x="838200" y="1006947"/>
+            <a:ext cx="4998156" cy="584775"/>
+          </a:xfrm>
+          <a:prstGeom prst="rect">
+            <a:avLst/>
+          </a:prstGeom>
+          <a:noFill/>
+        </p:spPr>
+        <p:txBody>
+          <a:bodyPr wrap="square" rtlCol="0">
+            <a:spAutoFit/>
+          </a:bodyPr>
+          <a:lstStyle/>
+          <a:p>
+            <a:r>
+              <a:rPr kumimoji="1" lang="en-US" altLang="ko-KR" sz="3200" i="1" dirty="0"/>
+              <a:t>italic true to false</a:t>
+            </a:r>
+            <a:endParaRPr kumimoji="1" lang="ko-KR" altLang="en-US" sz="3200" i="1" dirty="0"/>
+          </a:p>
+        </p:txBody>
+      </p:sp>
+      <p:sp>
+        <p:nvSpPr>
+          <p:cNvPr id="8" name="plain">
+            <a:extLst>
+              <a:ext uri="{FF2B5EF4-FFF2-40B4-BE49-F238E27FC236}">
+                <a16:creationId xmlns:a16="http://schemas.microsoft.com/office/drawing/2014/main" id="{62F87B04-7178-6A4E-8735-85C9F40DC56C}"/>
+              </a:ext>
+            </a:extLst>
+          </p:cNvPr>
+          <p:cNvSpPr txBox="1"/>
+          <p:nvPr/>
+        </p:nvSpPr>
+        <p:spPr>
+          <a:xfrm>
+            <a:off x="5935133" y="334107"/>
+            <a:ext cx="4998156" cy="584775"/>
+          </a:xfrm>
+          <a:prstGeom prst="rect">
+            <a:avLst/>
+          </a:prstGeom>
+          <a:noFill/>
+        </p:spPr>
+        <p:txBody>
+          <a:bodyPr wrap="square" rtlCol="0">
+            <a:spAutoFit/>
+          </a:bodyPr>
+          <a:lstStyle/>
+          <a:p>
+            <a:r>
+              <a:rPr kumimoji="1" lang="en-US" altLang="ko-KR" sz="3200" dirty="0"/>
+              <a:t>plain</a:t>
+            </a:r>
+            <a:endParaRPr kumimoji="1" lang="ko-KR" altLang="en-US" sz="3200" dirty="0"/>
+          </a:p>
+        </p:txBody>
+      </p:sp>
+      <p:sp>
+        <p:nvSpPr>
+          <p:cNvPr id="9" name="underline_text">
+            <a:extLst>
+              <a:ext uri="{FF2B5EF4-FFF2-40B4-BE49-F238E27FC236}">
+                <a16:creationId xmlns:a16="http://schemas.microsoft.com/office/drawing/2014/main" id="{111FED20-43B6-1E43-989C-83647F79E9B0}"/>
+              </a:ext>
+            </a:extLst>
+          </p:cNvPr>
+          <p:cNvSpPr txBox="1"/>
+          <p:nvPr/>
+        </p:nvSpPr>
+        <p:spPr>
+          <a:xfrm>
+            <a:off x="838200" y="1679786"/>
+            <a:ext cx="4998156" cy="584775"/>
+          </a:xfrm>
+          <a:prstGeom prst="rect">
+            <a:avLst/>
+          </a:prstGeom>
+          <a:noFill/>
+        </p:spPr>
+        <p:txBody>
+          <a:bodyPr wrap="square" rtlCol="0">
+            <a:spAutoFit/>
+          </a:bodyPr>
+          <a:lstStyle/>
+          <a:p>
+            <a:r>
+              <a:rPr kumimoji="1" lang="en-US" altLang="ko-KR" sz="3200" u="sng" dirty="0"/>
+              <a:t>underline true to false</a:t>
+            </a:r>
+            <a:endParaRPr kumimoji="1" lang="ko-KR" altLang="en-US" sz="3200" u="sng" dirty="0"/>
+          </a:p>
+        </p:txBody>
+      </p:sp>
+    </p:spTree>
+    <p:extLst>
+      <p:ext uri="{BB962C8B-B14F-4D97-AF65-F5344CB8AC3E}">
+        <p14:creationId xmlns:p14="http://schemas.microsoft.com/office/powerpoint/2010/main" val="3174727061"/>
       </p:ext>
     </p:extLst>
   </p:cSld>

</xml_diff>